<commit_message>
added fix cross detail in welcome message
</commit_message>
<xml_diff>
--- a/experiment-Lab/messages.pptx
+++ b/experiment-Lab/messages.pptx
@@ -2999,7 +2999,7 @@
         <p:spPr>
           <a:xfrm>
             <a:off x="1473869" y="100012"/>
-            <a:ext cx="9555240" cy="6657976"/>
+            <a:ext cx="9555240" cy="6464847"/>
           </a:xfrm>
           <a:prstGeom prst="rect">
             <a:avLst/>
@@ -3020,7 +3020,7 @@
               </a:spcAft>
             </a:pPr>
             <a:r>
-              <a:rPr lang="en-US" dirty="0">
+              <a:rPr lang="en-US" sz="1600" dirty="0">
                 <a:solidFill>
                   <a:schemeClr val="bg1"/>
                 </a:solidFill>
@@ -3029,7 +3029,7 @@
               </a:rPr>
               <a:t>Welcome to the Abstract Reasoning Experiment</a:t>
             </a:r>
-            <a:endParaRPr lang="nl-NL" dirty="0" smtClean="0">
+            <a:endParaRPr lang="nl-NL" sz="1600" dirty="0" smtClean="0">
               <a:solidFill>
                 <a:schemeClr val="bg1"/>
               </a:solidFill>
@@ -3048,7 +3048,7 @@
               </a:spcAft>
             </a:pPr>
             <a:r>
-              <a:rPr lang="en-US" dirty="0">
+              <a:rPr lang="en-US" sz="1600" dirty="0">
                 <a:solidFill>
                   <a:schemeClr val="bg1"/>
                 </a:solidFill>
@@ -3058,7 +3058,7 @@
               <a:t>In this study, you will solve </a:t>
             </a:r>
             <a:r>
-              <a:rPr lang="en-US" dirty="0" smtClean="0">
+              <a:rPr lang="en-US" sz="1600" dirty="0" smtClean="0">
                 <a:solidFill>
                   <a:schemeClr val="bg1"/>
                 </a:solidFill>
@@ -3068,7 +3068,7 @@
               <a:t>reasoning </a:t>
             </a:r>
             <a:r>
-              <a:rPr lang="en-US" dirty="0">
+              <a:rPr lang="en-US" sz="1600" dirty="0">
                 <a:solidFill>
                   <a:schemeClr val="bg1"/>
                 </a:solidFill>
@@ -3077,7 +3077,7 @@
               </a:rPr>
               <a:t>problems involving sequences of black icons.</a:t>
             </a:r>
-            <a:endParaRPr lang="nl-NL" dirty="0" smtClean="0">
+            <a:endParaRPr lang="nl-NL" sz="1600" dirty="0" smtClean="0">
               <a:solidFill>
                 <a:schemeClr val="bg1"/>
               </a:solidFill>
@@ -3096,7 +3096,7 @@
               </a:spcAft>
             </a:pPr>
             <a:r>
-              <a:rPr lang="nl-NL" dirty="0">
+              <a:rPr lang="nl-NL" sz="1600" dirty="0">
                 <a:solidFill>
                   <a:schemeClr val="bg1"/>
                 </a:solidFill>
@@ -3106,7 +3106,7 @@
               <a:t>For each </a:t>
             </a:r>
             <a:r>
-              <a:rPr lang="nl-NL" dirty="0" smtClean="0">
+              <a:rPr lang="nl-NL" sz="1600" dirty="0" smtClean="0">
                 <a:solidFill>
                   <a:schemeClr val="bg1"/>
                 </a:solidFill>
@@ -3127,7 +3127,7 @@
               <a:buAutoNum type="arabicPeriod"/>
             </a:pPr>
             <a:r>
-              <a:rPr lang="nl-NL" dirty="0" smtClean="0">
+              <a:rPr lang="nl-NL" sz="1600" dirty="0" smtClean="0">
                 <a:solidFill>
                   <a:schemeClr val="bg1"/>
                 </a:solidFill>
@@ -3137,7 +3137,7 @@
               <a:t>A </a:t>
             </a:r>
             <a:r>
-              <a:rPr lang="nl-NL" dirty="0" err="1" smtClean="0">
+              <a:rPr lang="nl-NL" sz="1600" dirty="0" err="1" smtClean="0">
                 <a:solidFill>
                   <a:schemeClr val="bg1"/>
                 </a:solidFill>
@@ -3147,7 +3147,7 @@
               <a:t>sequence</a:t>
             </a:r>
             <a:r>
-              <a:rPr lang="nl-NL" dirty="0" smtClean="0">
+              <a:rPr lang="nl-NL" sz="1600" dirty="0" smtClean="0">
                 <a:solidFill>
                   <a:schemeClr val="bg1"/>
                 </a:solidFill>
@@ -3157,7 +3157,7 @@
               <a:t> of </a:t>
             </a:r>
             <a:r>
-              <a:rPr lang="nl-NL" dirty="0" err="1" smtClean="0">
+              <a:rPr lang="nl-NL" sz="1600" dirty="0" err="1" smtClean="0">
                 <a:solidFill>
                   <a:schemeClr val="bg1"/>
                 </a:solidFill>
@@ -3167,7 +3167,7 @@
               <a:t>icons</a:t>
             </a:r>
             <a:r>
-              <a:rPr lang="nl-NL" dirty="0" smtClean="0">
+              <a:rPr lang="nl-NL" sz="1600" dirty="0" smtClean="0">
                 <a:solidFill>
                   <a:schemeClr val="bg1"/>
                 </a:solidFill>
@@ -3177,7 +3177,7 @@
               <a:t> </a:t>
             </a:r>
             <a:r>
-              <a:rPr lang="nl-NL" dirty="0" err="1" smtClean="0">
+              <a:rPr lang="nl-NL" sz="1600" dirty="0" err="1" smtClean="0">
                 <a:solidFill>
                   <a:schemeClr val="bg1"/>
                 </a:solidFill>
@@ -3187,7 +3187,7 @@
               <a:t>will</a:t>
             </a:r>
             <a:r>
-              <a:rPr lang="nl-NL" dirty="0" smtClean="0">
+              <a:rPr lang="nl-NL" sz="1600" dirty="0" smtClean="0">
                 <a:solidFill>
                   <a:schemeClr val="bg1"/>
                 </a:solidFill>
@@ -3197,7 +3197,7 @@
               <a:t> </a:t>
             </a:r>
             <a:r>
-              <a:rPr lang="nl-NL" dirty="0" err="1" smtClean="0">
+              <a:rPr lang="nl-NL" sz="1600" dirty="0" err="1" smtClean="0">
                 <a:solidFill>
                   <a:schemeClr val="bg1"/>
                 </a:solidFill>
@@ -3207,7 +3207,7 @@
               <a:t>be</a:t>
             </a:r>
             <a:r>
-              <a:rPr lang="nl-NL" dirty="0" smtClean="0">
+              <a:rPr lang="nl-NL" sz="1600" dirty="0" smtClean="0">
                 <a:solidFill>
                   <a:schemeClr val="bg1"/>
                 </a:solidFill>
@@ -3217,7 +3217,7 @@
               <a:t> </a:t>
             </a:r>
             <a:r>
-              <a:rPr lang="nl-NL" dirty="0" err="1" smtClean="0">
+              <a:rPr lang="nl-NL" sz="1600" dirty="0" err="1" smtClean="0">
                 <a:solidFill>
                   <a:schemeClr val="bg1"/>
                 </a:solidFill>
@@ -3227,7 +3227,7 @@
               <a:t>shown</a:t>
             </a:r>
             <a:r>
-              <a:rPr lang="nl-NL" dirty="0" smtClean="0">
+              <a:rPr lang="nl-NL" sz="1600" dirty="0" smtClean="0">
                 <a:solidFill>
                   <a:schemeClr val="bg1"/>
                 </a:solidFill>
@@ -3237,7 +3237,7 @@
               <a:t> in </a:t>
             </a:r>
             <a:r>
-              <a:rPr lang="nl-NL" dirty="0" err="1" smtClean="0">
+              <a:rPr lang="nl-NL" sz="1600" dirty="0" err="1" smtClean="0">
                 <a:solidFill>
                   <a:schemeClr val="bg1"/>
                 </a:solidFill>
@@ -3247,7 +3247,7 @@
               <a:t>the</a:t>
             </a:r>
             <a:r>
-              <a:rPr lang="nl-NL" dirty="0" smtClean="0">
+              <a:rPr lang="nl-NL" sz="1600" dirty="0" smtClean="0">
                 <a:solidFill>
                   <a:schemeClr val="bg1"/>
                 </a:solidFill>
@@ -3257,7 +3257,7 @@
               <a:t> top </a:t>
             </a:r>
             <a:r>
-              <a:rPr lang="nl-NL" dirty="0" err="1" smtClean="0">
+              <a:rPr lang="nl-NL" sz="1600" dirty="0" err="1" smtClean="0">
                 <a:solidFill>
                   <a:schemeClr val="bg1"/>
                 </a:solidFill>
@@ -3267,7 +3267,7 @@
               <a:t>row</a:t>
             </a:r>
             <a:r>
-              <a:rPr lang="nl-NL" dirty="0" smtClean="0">
+              <a:rPr lang="nl-NL" sz="1600" dirty="0" smtClean="0">
                 <a:solidFill>
                   <a:schemeClr val="bg1"/>
                 </a:solidFill>
@@ -3277,7 +3277,7 @@
               <a:t>, </a:t>
             </a:r>
             <a:r>
-              <a:rPr lang="nl-NL" dirty="0" err="1" smtClean="0">
+              <a:rPr lang="nl-NL" sz="1600" dirty="0" err="1" smtClean="0">
                 <a:solidFill>
                   <a:schemeClr val="bg1"/>
                 </a:solidFill>
@@ -3287,7 +3287,7 @@
               <a:t>followed</a:t>
             </a:r>
             <a:r>
-              <a:rPr lang="nl-NL" dirty="0" smtClean="0">
+              <a:rPr lang="nl-NL" sz="1600" dirty="0" smtClean="0">
                 <a:solidFill>
                   <a:schemeClr val="bg1"/>
                 </a:solidFill>
@@ -3297,7 +3297,7 @@
               <a:t> </a:t>
             </a:r>
             <a:r>
-              <a:rPr lang="nl-NL" dirty="0" err="1" smtClean="0">
+              <a:rPr lang="nl-NL" sz="1600" dirty="0" err="1" smtClean="0">
                 <a:solidFill>
                   <a:schemeClr val="bg1"/>
                 </a:solidFill>
@@ -3307,26 +3307,16 @@
               <a:t>by</a:t>
             </a:r>
             <a:r>
-              <a:rPr lang="nl-NL" dirty="0" smtClean="0">
-                <a:solidFill>
-                  <a:schemeClr val="bg1"/>
-                </a:solidFill>
-                <a:ea typeface="Times New Roman" panose="02020603050405020304" pitchFamily="18" charset="0"/>
-                <a:cs typeface="Times New Roman" panose="02020603050405020304" pitchFamily="18" charset="0"/>
-              </a:rPr>
-              <a:t> a question </a:t>
-            </a:r>
-            <a:r>
-              <a:rPr lang="nl-NL" dirty="0" smtClean="0">
-                <a:solidFill>
-                  <a:schemeClr val="bg1"/>
-                </a:solidFill>
-                <a:ea typeface="Times New Roman" panose="02020603050405020304" pitchFamily="18" charset="0"/>
-                <a:cs typeface="Times New Roman" panose="02020603050405020304" pitchFamily="18" charset="0"/>
-              </a:rPr>
-              <a:t>mark.</a:t>
-            </a:r>
-            <a:endParaRPr lang="nl-NL" dirty="0">
+              <a:rPr lang="nl-NL" sz="1600" dirty="0" smtClean="0">
+                <a:solidFill>
+                  <a:schemeClr val="bg1"/>
+                </a:solidFill>
+                <a:ea typeface="Times New Roman" panose="02020603050405020304" pitchFamily="18" charset="0"/>
+                <a:cs typeface="Times New Roman" panose="02020603050405020304" pitchFamily="18" charset="0"/>
+              </a:rPr>
+              <a:t> a question mark.</a:t>
+            </a:r>
+            <a:endParaRPr lang="nl-NL" sz="1600" dirty="0">
               <a:solidFill>
                 <a:schemeClr val="bg1"/>
               </a:solidFill>
@@ -3345,7 +3335,7 @@
               <a:buAutoNum type="arabicPeriod"/>
             </a:pPr>
             <a:r>
-              <a:rPr lang="nl-NL" dirty="0" err="1" smtClean="0">
+              <a:rPr lang="nl-NL" sz="1600" dirty="0" err="1" smtClean="0">
                 <a:solidFill>
                   <a:schemeClr val="bg1"/>
                 </a:solidFill>
@@ -3355,7 +3345,7 @@
               <a:t>Four</a:t>
             </a:r>
             <a:r>
-              <a:rPr lang="nl-NL" dirty="0" smtClean="0">
+              <a:rPr lang="nl-NL" sz="1600" dirty="0" smtClean="0">
                 <a:solidFill>
                   <a:schemeClr val="bg1"/>
                 </a:solidFill>
@@ -3365,7 +3355,7 @@
               <a:t> </a:t>
             </a:r>
             <a:r>
-              <a:rPr lang="nl-NL" dirty="0" err="1" smtClean="0">
+              <a:rPr lang="nl-NL" sz="1600" dirty="0" err="1" smtClean="0">
                 <a:solidFill>
                   <a:schemeClr val="bg1"/>
                 </a:solidFill>
@@ -3375,7 +3365,7 @@
               <a:t>icons</a:t>
             </a:r>
             <a:r>
-              <a:rPr lang="nl-NL" dirty="0" smtClean="0">
+              <a:rPr lang="nl-NL" sz="1600" dirty="0" smtClean="0">
                 <a:solidFill>
                   <a:schemeClr val="bg1"/>
                 </a:solidFill>
@@ -3385,7 +3375,7 @@
               <a:t> </a:t>
             </a:r>
             <a:r>
-              <a:rPr lang="nl-NL" dirty="0" err="1" smtClean="0">
+              <a:rPr lang="nl-NL" sz="1600" dirty="0" err="1" smtClean="0">
                 <a:solidFill>
                   <a:schemeClr val="bg1"/>
                 </a:solidFill>
@@ -3395,7 +3385,7 @@
               <a:t>will</a:t>
             </a:r>
             <a:r>
-              <a:rPr lang="nl-NL" dirty="0" smtClean="0">
+              <a:rPr lang="nl-NL" sz="1600" dirty="0" smtClean="0">
                 <a:solidFill>
                   <a:schemeClr val="bg1"/>
                 </a:solidFill>
@@ -3405,7 +3395,7 @@
               <a:t> </a:t>
             </a:r>
             <a:r>
-              <a:rPr lang="nl-NL" dirty="0" err="1" smtClean="0">
+              <a:rPr lang="nl-NL" sz="1600" dirty="0" err="1" smtClean="0">
                 <a:solidFill>
                   <a:schemeClr val="bg1"/>
                 </a:solidFill>
@@ -3415,7 +3405,7 @@
               <a:t>be</a:t>
             </a:r>
             <a:r>
-              <a:rPr lang="nl-NL" dirty="0" smtClean="0">
+              <a:rPr lang="nl-NL" sz="1600" dirty="0" smtClean="0">
                 <a:solidFill>
                   <a:schemeClr val="bg1"/>
                 </a:solidFill>
@@ -3425,7 +3415,7 @@
               <a:t> </a:t>
             </a:r>
             <a:r>
-              <a:rPr lang="nl-NL" dirty="0" err="1" smtClean="0">
+              <a:rPr lang="nl-NL" sz="1600" dirty="0" err="1" smtClean="0">
                 <a:solidFill>
                   <a:schemeClr val="bg1"/>
                 </a:solidFill>
@@ -3435,7 +3425,7 @@
               <a:t>shown</a:t>
             </a:r>
             <a:r>
-              <a:rPr lang="nl-NL" dirty="0" smtClean="0">
+              <a:rPr lang="nl-NL" sz="1600" dirty="0" smtClean="0">
                 <a:solidFill>
                   <a:schemeClr val="bg1"/>
                 </a:solidFill>
@@ -3445,7 +3435,7 @@
               <a:t> on </a:t>
             </a:r>
             <a:r>
-              <a:rPr lang="nl-NL" dirty="0" err="1" smtClean="0">
+              <a:rPr lang="nl-NL" sz="1600" dirty="0" err="1" smtClean="0">
                 <a:solidFill>
                   <a:schemeClr val="bg1"/>
                 </a:solidFill>
@@ -3455,7 +3445,7 @@
               <a:t>the</a:t>
             </a:r>
             <a:r>
-              <a:rPr lang="nl-NL" dirty="0" smtClean="0">
+              <a:rPr lang="nl-NL" sz="1600" dirty="0" smtClean="0">
                 <a:solidFill>
                   <a:schemeClr val="bg1"/>
                 </a:solidFill>
@@ -3465,7 +3455,7 @@
               <a:t> </a:t>
             </a:r>
             <a:r>
-              <a:rPr lang="nl-NL" dirty="0" err="1" smtClean="0">
+              <a:rPr lang="nl-NL" sz="1600" dirty="0" err="1" smtClean="0">
                 <a:solidFill>
                   <a:schemeClr val="bg1"/>
                 </a:solidFill>
@@ -3475,7 +3465,7 @@
               <a:t>bottom</a:t>
             </a:r>
             <a:r>
-              <a:rPr lang="nl-NL" dirty="0" smtClean="0">
+              <a:rPr lang="nl-NL" sz="1600" dirty="0" smtClean="0">
                 <a:solidFill>
                   <a:schemeClr val="bg1"/>
                 </a:solidFill>
@@ -3485,7 +3475,7 @@
               <a:t> </a:t>
             </a:r>
             <a:r>
-              <a:rPr lang="nl-NL" dirty="0" err="1" smtClean="0">
+              <a:rPr lang="nl-NL" sz="1600" dirty="0" err="1" smtClean="0">
                 <a:solidFill>
                   <a:schemeClr val="bg1"/>
                 </a:solidFill>
@@ -3495,7 +3485,7 @@
               <a:t>row</a:t>
             </a:r>
             <a:r>
-              <a:rPr lang="nl-NL" dirty="0" smtClean="0">
+              <a:rPr lang="nl-NL" sz="1600" dirty="0" smtClean="0">
                 <a:solidFill>
                   <a:schemeClr val="bg1"/>
                 </a:solidFill>
@@ -3504,13 +3494,6 @@
               </a:rPr>
               <a:t>.</a:t>
             </a:r>
-            <a:endParaRPr lang="nl-NL" dirty="0" smtClean="0">
-              <a:solidFill>
-                <a:schemeClr val="bg1"/>
-              </a:solidFill>
-              <a:ea typeface="Times New Roman" panose="02020603050405020304" pitchFamily="18" charset="0"/>
-              <a:cs typeface="Times New Roman" panose="02020603050405020304" pitchFamily="18" charset="0"/>
-            </a:endParaRPr>
           </a:p>
           <a:p>
             <a:pPr marL="800100" lvl="1" indent="-342900">
@@ -3523,7 +3506,7 @@
               <a:buAutoNum type="arabicPeriod"/>
             </a:pPr>
             <a:r>
-              <a:rPr lang="nl-NL" dirty="0" err="1" smtClean="0">
+              <a:rPr lang="nl-NL" sz="1600" dirty="0" err="1" smtClean="0">
                 <a:solidFill>
                   <a:schemeClr val="bg1"/>
                 </a:solidFill>
@@ -3533,7 +3516,7 @@
               <a:t>Your</a:t>
             </a:r>
             <a:r>
-              <a:rPr lang="nl-NL" dirty="0" smtClean="0">
+              <a:rPr lang="nl-NL" sz="1600" dirty="0" smtClean="0">
                 <a:solidFill>
                   <a:schemeClr val="bg1"/>
                 </a:solidFill>
@@ -3543,7 +3526,7 @@
               <a:t> </a:t>
             </a:r>
             <a:r>
-              <a:rPr lang="nl-NL" dirty="0" err="1" smtClean="0">
+              <a:rPr lang="nl-NL" sz="1600" dirty="0" err="1" smtClean="0">
                 <a:solidFill>
                   <a:schemeClr val="bg1"/>
                 </a:solidFill>
@@ -3553,7 +3536,7 @@
               <a:t>task</a:t>
             </a:r>
             <a:r>
-              <a:rPr lang="nl-NL" dirty="0" smtClean="0">
+              <a:rPr lang="nl-NL" sz="1600" dirty="0" smtClean="0">
                 <a:solidFill>
                   <a:schemeClr val="bg1"/>
                 </a:solidFill>
@@ -3563,7 +3546,7 @@
               <a:t> is </a:t>
             </a:r>
             <a:r>
-              <a:rPr lang="nl-NL" dirty="0" err="1" smtClean="0">
+              <a:rPr lang="nl-NL" sz="1600" dirty="0" err="1" smtClean="0">
                 <a:solidFill>
                   <a:schemeClr val="bg1"/>
                 </a:solidFill>
@@ -3573,7 +3556,7 @@
               <a:t>to</a:t>
             </a:r>
             <a:r>
-              <a:rPr lang="nl-NL" dirty="0" smtClean="0">
+              <a:rPr lang="nl-NL" sz="1600" dirty="0" smtClean="0">
                 <a:solidFill>
                   <a:schemeClr val="bg1"/>
                 </a:solidFill>
@@ -3583,7 +3566,7 @@
               <a:t> </a:t>
             </a:r>
             <a:r>
-              <a:rPr lang="nl-NL" dirty="0" err="1" smtClean="0">
+              <a:rPr lang="nl-NL" sz="1600" dirty="0" err="1" smtClean="0">
                 <a:solidFill>
                   <a:schemeClr val="bg1"/>
                 </a:solidFill>
@@ -3593,7 +3576,7 @@
               <a:t>choose</a:t>
             </a:r>
             <a:r>
-              <a:rPr lang="nl-NL" dirty="0" smtClean="0">
+              <a:rPr lang="nl-NL" sz="1600" dirty="0" smtClean="0">
                 <a:solidFill>
                   <a:schemeClr val="bg1"/>
                 </a:solidFill>
@@ -3603,7 +3586,7 @@
               <a:t> </a:t>
             </a:r>
             <a:r>
-              <a:rPr lang="nl-NL" dirty="0" err="1" smtClean="0">
+              <a:rPr lang="nl-NL" sz="1600" dirty="0" err="1" smtClean="0">
                 <a:solidFill>
                   <a:schemeClr val="bg1"/>
                 </a:solidFill>
@@ -3613,7 +3596,7 @@
               <a:t>which</a:t>
             </a:r>
             <a:r>
-              <a:rPr lang="nl-NL" dirty="0" smtClean="0">
+              <a:rPr lang="nl-NL" sz="1600" dirty="0" smtClean="0">
                 <a:solidFill>
                   <a:schemeClr val="bg1"/>
                 </a:solidFill>
@@ -3623,7 +3606,7 @@
               <a:t> of </a:t>
             </a:r>
             <a:r>
-              <a:rPr lang="nl-NL" dirty="0" err="1" smtClean="0">
+              <a:rPr lang="nl-NL" sz="1600" dirty="0" err="1" smtClean="0">
                 <a:solidFill>
                   <a:schemeClr val="bg1"/>
                 </a:solidFill>
@@ -3633,7 +3616,7 @@
               <a:t>the</a:t>
             </a:r>
             <a:r>
-              <a:rPr lang="nl-NL" dirty="0" smtClean="0">
+              <a:rPr lang="nl-NL" sz="1600" dirty="0" smtClean="0">
                 <a:solidFill>
                   <a:schemeClr val="bg1"/>
                 </a:solidFill>
@@ -3643,7 +3626,7 @@
               <a:t> </a:t>
             </a:r>
             <a:r>
-              <a:rPr lang="nl-NL" dirty="0" err="1" smtClean="0">
+              <a:rPr lang="nl-NL" sz="1600" dirty="0" err="1" smtClean="0">
                 <a:solidFill>
                   <a:schemeClr val="bg1"/>
                 </a:solidFill>
@@ -3653,7 +3636,7 @@
               <a:t>four</a:t>
             </a:r>
             <a:r>
-              <a:rPr lang="nl-NL" dirty="0" smtClean="0">
+              <a:rPr lang="nl-NL" sz="1600" dirty="0" smtClean="0">
                 <a:solidFill>
                   <a:schemeClr val="bg1"/>
                 </a:solidFill>
@@ -3663,7 +3646,7 @@
               <a:t> </a:t>
             </a:r>
             <a:r>
-              <a:rPr lang="nl-NL" dirty="0" err="1" smtClean="0">
+              <a:rPr lang="nl-NL" sz="1600" dirty="0" err="1" smtClean="0">
                 <a:solidFill>
                   <a:schemeClr val="bg1"/>
                 </a:solidFill>
@@ -3673,7 +3656,7 @@
               <a:t>icons</a:t>
             </a:r>
             <a:r>
-              <a:rPr lang="nl-NL" dirty="0" smtClean="0">
+              <a:rPr lang="nl-NL" sz="1600" dirty="0" smtClean="0">
                 <a:solidFill>
                   <a:schemeClr val="bg1"/>
                 </a:solidFill>
@@ -3683,7 +3666,7 @@
               <a:t> in </a:t>
             </a:r>
             <a:r>
-              <a:rPr lang="nl-NL" dirty="0" err="1" smtClean="0">
+              <a:rPr lang="nl-NL" sz="1600" dirty="0" err="1" smtClean="0">
                 <a:solidFill>
                   <a:schemeClr val="bg1"/>
                 </a:solidFill>
@@ -3693,7 +3676,7 @@
               <a:t>the</a:t>
             </a:r>
             <a:r>
-              <a:rPr lang="nl-NL" dirty="0" smtClean="0">
+              <a:rPr lang="nl-NL" sz="1600" dirty="0" smtClean="0">
                 <a:solidFill>
                   <a:schemeClr val="bg1"/>
                 </a:solidFill>
@@ -3703,7 +3686,7 @@
               <a:t> </a:t>
             </a:r>
             <a:r>
-              <a:rPr lang="nl-NL" dirty="0" err="1" smtClean="0">
+              <a:rPr lang="nl-NL" sz="1600" dirty="0" err="1" smtClean="0">
                 <a:solidFill>
                   <a:schemeClr val="bg1"/>
                 </a:solidFill>
@@ -3713,7 +3696,7 @@
               <a:t>bottom</a:t>
             </a:r>
             <a:r>
-              <a:rPr lang="nl-NL" dirty="0" smtClean="0">
+              <a:rPr lang="nl-NL" sz="1600" dirty="0" smtClean="0">
                 <a:solidFill>
                   <a:schemeClr val="bg1"/>
                 </a:solidFill>
@@ -3723,7 +3706,7 @@
               <a:t> </a:t>
             </a:r>
             <a:r>
-              <a:rPr lang="nl-NL" dirty="0" err="1" smtClean="0">
+              <a:rPr lang="nl-NL" sz="1600" dirty="0" err="1" smtClean="0">
                 <a:solidFill>
                   <a:schemeClr val="bg1"/>
                 </a:solidFill>
@@ -3733,7 +3716,7 @@
               <a:t>row</a:t>
             </a:r>
             <a:r>
-              <a:rPr lang="nl-NL" dirty="0" smtClean="0">
+              <a:rPr lang="nl-NL" sz="1600" dirty="0" smtClean="0">
                 <a:solidFill>
                   <a:schemeClr val="bg1"/>
                 </a:solidFill>
@@ -3743,7 +3726,7 @@
               <a:t> best </a:t>
             </a:r>
             <a:r>
-              <a:rPr lang="nl-NL" dirty="0" err="1" smtClean="0">
+              <a:rPr lang="nl-NL" sz="1600" dirty="0" err="1" smtClean="0">
                 <a:solidFill>
                   <a:schemeClr val="bg1"/>
                 </a:solidFill>
@@ -3753,7 +3736,7 @@
               <a:t>continues</a:t>
             </a:r>
             <a:r>
-              <a:rPr lang="nl-NL" dirty="0" smtClean="0">
+              <a:rPr lang="nl-NL" sz="1600" dirty="0" smtClean="0">
                 <a:solidFill>
                   <a:schemeClr val="bg1"/>
                 </a:solidFill>
@@ -3763,7 +3746,7 @@
               <a:t> </a:t>
             </a:r>
             <a:r>
-              <a:rPr lang="nl-NL" dirty="0" err="1" smtClean="0">
+              <a:rPr lang="nl-NL" sz="1600" dirty="0" err="1" smtClean="0">
                 <a:solidFill>
                   <a:schemeClr val="bg1"/>
                 </a:solidFill>
@@ -3773,7 +3756,7 @@
               <a:t>the</a:t>
             </a:r>
             <a:r>
-              <a:rPr lang="nl-NL" dirty="0" smtClean="0">
+              <a:rPr lang="nl-NL" sz="1600" dirty="0" smtClean="0">
                 <a:solidFill>
                   <a:schemeClr val="bg1"/>
                 </a:solidFill>
@@ -3783,7 +3766,7 @@
               <a:t> </a:t>
             </a:r>
             <a:r>
-              <a:rPr lang="nl-NL" dirty="0" err="1" smtClean="0">
+              <a:rPr lang="nl-NL" sz="1600" dirty="0" err="1" smtClean="0">
                 <a:solidFill>
                   <a:schemeClr val="bg1"/>
                 </a:solidFill>
@@ -3793,7 +3776,7 @@
               <a:t>sequence</a:t>
             </a:r>
             <a:r>
-              <a:rPr lang="nl-NL" dirty="0" smtClean="0">
+              <a:rPr lang="nl-NL" sz="1600" dirty="0" smtClean="0">
                 <a:solidFill>
                   <a:schemeClr val="bg1"/>
                 </a:solidFill>
@@ -3803,7 +3786,7 @@
               <a:t> </a:t>
             </a:r>
             <a:r>
-              <a:rPr lang="nl-NL" dirty="0" err="1" smtClean="0">
+              <a:rPr lang="nl-NL" sz="1600" dirty="0" err="1" smtClean="0">
                 <a:solidFill>
                   <a:schemeClr val="bg1"/>
                 </a:solidFill>
@@ -3813,7 +3796,7 @@
               <a:t>above</a:t>
             </a:r>
             <a:r>
-              <a:rPr lang="nl-NL" dirty="0" smtClean="0">
+              <a:rPr lang="nl-NL" sz="1600" dirty="0" smtClean="0">
                 <a:solidFill>
                   <a:schemeClr val="bg1"/>
                 </a:solidFill>
@@ -3823,7 +3806,7 @@
               <a:t>, </a:t>
             </a:r>
             <a:r>
-              <a:rPr lang="nl-NL" dirty="0" err="1" smtClean="0">
+              <a:rPr lang="nl-NL" sz="1600" dirty="0" err="1" smtClean="0">
                 <a:solidFill>
                   <a:schemeClr val="bg1"/>
                 </a:solidFill>
@@ -3833,7 +3816,7 @@
               <a:t>thus</a:t>
             </a:r>
             <a:r>
-              <a:rPr lang="nl-NL" dirty="0" smtClean="0">
+              <a:rPr lang="nl-NL" sz="1600" dirty="0" smtClean="0">
                 <a:solidFill>
                   <a:schemeClr val="bg1"/>
                 </a:solidFill>
@@ -3843,7 +3826,7 @@
               <a:t> </a:t>
             </a:r>
             <a:r>
-              <a:rPr lang="nl-NL" dirty="0" err="1" smtClean="0">
+              <a:rPr lang="nl-NL" sz="1600" dirty="0" err="1" smtClean="0">
                 <a:solidFill>
                   <a:schemeClr val="bg1"/>
                 </a:solidFill>
@@ -3853,7 +3836,7 @@
               <a:t>replacing</a:t>
             </a:r>
             <a:r>
-              <a:rPr lang="nl-NL" dirty="0" smtClean="0">
+              <a:rPr lang="nl-NL" sz="1600" dirty="0" smtClean="0">
                 <a:solidFill>
                   <a:schemeClr val="bg1"/>
                 </a:solidFill>
@@ -3863,7 +3846,7 @@
               <a:t> </a:t>
             </a:r>
             <a:r>
-              <a:rPr lang="nl-NL" dirty="0" err="1" smtClean="0">
+              <a:rPr lang="nl-NL" sz="1600" dirty="0" err="1" smtClean="0">
                 <a:solidFill>
                   <a:schemeClr val="bg1"/>
                 </a:solidFill>
@@ -3873,26 +3856,16 @@
               <a:t>the</a:t>
             </a:r>
             <a:r>
-              <a:rPr lang="nl-NL" dirty="0" smtClean="0">
-                <a:solidFill>
-                  <a:schemeClr val="bg1"/>
-                </a:solidFill>
-                <a:ea typeface="Times New Roman" panose="02020603050405020304" pitchFamily="18" charset="0"/>
-                <a:cs typeface="Times New Roman" panose="02020603050405020304" pitchFamily="18" charset="0"/>
-              </a:rPr>
-              <a:t> question </a:t>
-            </a:r>
-            <a:r>
-              <a:rPr lang="nl-NL" dirty="0" smtClean="0">
-                <a:solidFill>
-                  <a:schemeClr val="bg1"/>
-                </a:solidFill>
-                <a:ea typeface="Times New Roman" panose="02020603050405020304" pitchFamily="18" charset="0"/>
-                <a:cs typeface="Times New Roman" panose="02020603050405020304" pitchFamily="18" charset="0"/>
-              </a:rPr>
-              <a:t>mark.</a:t>
-            </a:r>
-            <a:endParaRPr lang="nl-NL" dirty="0">
+              <a:rPr lang="nl-NL" sz="1600" dirty="0" smtClean="0">
+                <a:solidFill>
+                  <a:schemeClr val="bg1"/>
+                </a:solidFill>
+                <a:ea typeface="Times New Roman" panose="02020603050405020304" pitchFamily="18" charset="0"/>
+                <a:cs typeface="Times New Roman" panose="02020603050405020304" pitchFamily="18" charset="0"/>
+              </a:rPr>
+              <a:t> question mark.</a:t>
+            </a:r>
+            <a:endParaRPr lang="nl-NL" sz="1600" dirty="0">
               <a:solidFill>
                 <a:schemeClr val="bg1"/>
               </a:solidFill>
@@ -3910,7 +3883,7 @@
               </a:spcAft>
             </a:pPr>
             <a:r>
-              <a:rPr lang="en-US" dirty="0" smtClean="0">
+              <a:rPr lang="en-US" sz="1600" dirty="0" smtClean="0">
                 <a:solidFill>
                   <a:schemeClr val="bg1"/>
                 </a:solidFill>
@@ -3932,7 +3905,7 @@
               <a:buChar char="-"/>
             </a:pPr>
             <a:r>
-              <a:rPr lang="en-US" dirty="0" smtClean="0">
+              <a:rPr lang="en-US" sz="1600" dirty="0" smtClean="0">
                 <a:solidFill>
                   <a:schemeClr val="bg1"/>
                 </a:solidFill>
@@ -3942,7 +3915,7 @@
               <a:t>Icons in the top and bottom row will first </a:t>
             </a:r>
             <a:r>
-              <a:rPr lang="en-US" dirty="0">
+              <a:rPr lang="en-US" sz="1600" dirty="0">
                 <a:solidFill>
                   <a:schemeClr val="bg1"/>
                 </a:solidFill>
@@ -3952,26 +3925,16 @@
               <a:t>be briefly shown one </a:t>
             </a:r>
             <a:r>
-              <a:rPr lang="en-US" dirty="0" smtClean="0">
-                <a:solidFill>
-                  <a:schemeClr val="bg1"/>
-                </a:solidFill>
-                <a:ea typeface="Times New Roman" panose="02020603050405020304" pitchFamily="18" charset="0"/>
-                <a:cs typeface="Times New Roman" panose="02020603050405020304" pitchFamily="18" charset="0"/>
-              </a:rPr>
-              <a:t>by one and in random order. Next, all the icons will appear together at once and will remain on the screen until you make a </a:t>
-            </a:r>
-            <a:r>
-              <a:rPr lang="en-US" dirty="0" smtClean="0">
-                <a:solidFill>
-                  <a:schemeClr val="bg1"/>
-                </a:solidFill>
-                <a:ea typeface="Times New Roman" panose="02020603050405020304" pitchFamily="18" charset="0"/>
-                <a:cs typeface="Times New Roman" panose="02020603050405020304" pitchFamily="18" charset="0"/>
-              </a:rPr>
-              <a:t>decision.</a:t>
-            </a:r>
-            <a:endParaRPr lang="en-US" dirty="0">
+              <a:rPr lang="en-US" sz="1600" dirty="0" smtClean="0">
+                <a:solidFill>
+                  <a:schemeClr val="bg1"/>
+                </a:solidFill>
+                <a:ea typeface="Times New Roman" panose="02020603050405020304" pitchFamily="18" charset="0"/>
+                <a:cs typeface="Times New Roman" panose="02020603050405020304" pitchFamily="18" charset="0"/>
+              </a:rPr>
+              <a:t>by one and in random order. Next, all the icons will appear together at once and will remain on the screen until you make a decision.</a:t>
+            </a:r>
+            <a:endParaRPr lang="en-US" sz="1600" dirty="0">
               <a:solidFill>
                 <a:schemeClr val="bg1"/>
               </a:solidFill>
@@ -3989,7 +3952,7 @@
               <a:buChar char="-"/>
             </a:pPr>
             <a:r>
-              <a:rPr lang="en-US" dirty="0" smtClean="0">
+              <a:rPr lang="en-US" sz="1600" dirty="0" smtClean="0">
                 <a:solidFill>
                   <a:schemeClr val="bg1"/>
                 </a:solidFill>
@@ -3997,7 +3960,7 @@
               <a:t>You </a:t>
             </a:r>
             <a:r>
-              <a:rPr lang="en-US" dirty="0">
+              <a:rPr lang="en-US" sz="1600" dirty="0">
                 <a:solidFill>
                   <a:schemeClr val="bg1"/>
                 </a:solidFill>
@@ -4005,7 +3968,7 @@
               <a:t>will have a limited time window to make your </a:t>
             </a:r>
             <a:r>
-              <a:rPr lang="en-US" dirty="0">
+              <a:rPr lang="en-US" sz="1600" dirty="0">
                 <a:solidFill>
                   <a:schemeClr val="bg1"/>
                 </a:solidFill>
@@ -4015,7 +3978,7 @@
               <a:t>decision</a:t>
             </a:r>
             <a:r>
-              <a:rPr lang="en-US" dirty="0" smtClean="0">
+              <a:rPr lang="en-US" sz="1600" dirty="0" smtClean="0">
                 <a:solidFill>
                   <a:schemeClr val="bg1"/>
                 </a:solidFill>
@@ -4023,7 +3986,7 @@
               <a:t>, </a:t>
             </a:r>
             <a:r>
-              <a:rPr lang="en-US" dirty="0">
+              <a:rPr lang="en-US" sz="1600" dirty="0">
                 <a:solidFill>
                   <a:schemeClr val="bg1"/>
                 </a:solidFill>
@@ -4031,7 +3994,7 @@
               <a:t>so try to respond as quickly and accurately as possible</a:t>
             </a:r>
             <a:r>
-              <a:rPr lang="en-US" dirty="0" smtClean="0">
+              <a:rPr lang="en-US" sz="1600" dirty="0" smtClean="0">
                 <a:solidFill>
                   <a:schemeClr val="bg1"/>
                 </a:solidFill>
@@ -4040,13 +4003,6 @@
               </a:rPr>
               <a:t>.</a:t>
             </a:r>
-            <a:endParaRPr lang="nl-NL" dirty="0">
-              <a:solidFill>
-                <a:schemeClr val="bg1"/>
-              </a:solidFill>
-              <a:ea typeface="Times New Roman" panose="02020603050405020304" pitchFamily="18" charset="0"/>
-              <a:cs typeface="Times New Roman" panose="02020603050405020304" pitchFamily="18" charset="0"/>
-            </a:endParaRPr>
           </a:p>
           <a:p>
             <a:pPr marL="742950" lvl="1" indent="-285750">
@@ -4060,476 +4016,36 @@
               <a:buChar char="-"/>
             </a:pPr>
             <a:r>
-              <a:rPr lang="nl-NL" dirty="0" smtClean="0">
-                <a:solidFill>
-                  <a:schemeClr val="bg1"/>
-                </a:solidFill>
-                <a:ea typeface="Times New Roman" panose="02020603050405020304" pitchFamily="18" charset="0"/>
-                <a:cs typeface="Times New Roman" panose="02020603050405020304" pitchFamily="18" charset="0"/>
-              </a:rPr>
-              <a:t>The </a:t>
-            </a:r>
-            <a:r>
-              <a:rPr lang="nl-NL" dirty="0" err="1" smtClean="0">
-                <a:solidFill>
-                  <a:schemeClr val="bg1"/>
-                </a:solidFill>
-                <a:ea typeface="Times New Roman" panose="02020603050405020304" pitchFamily="18" charset="0"/>
-                <a:cs typeface="Times New Roman" panose="02020603050405020304" pitchFamily="18" charset="0"/>
-              </a:rPr>
-              <a:t>session</a:t>
-            </a:r>
-            <a:r>
-              <a:rPr lang="nl-NL" dirty="0" smtClean="0">
-                <a:solidFill>
-                  <a:schemeClr val="bg1"/>
-                </a:solidFill>
-                <a:ea typeface="Times New Roman" panose="02020603050405020304" pitchFamily="18" charset="0"/>
-                <a:cs typeface="Times New Roman" panose="02020603050405020304" pitchFamily="18" charset="0"/>
-              </a:rPr>
-              <a:t> is </a:t>
-            </a:r>
-            <a:r>
-              <a:rPr lang="nl-NL" dirty="0" err="1" smtClean="0">
-                <a:solidFill>
-                  <a:schemeClr val="bg1"/>
-                </a:solidFill>
-                <a:ea typeface="Times New Roman" panose="02020603050405020304" pitchFamily="18" charset="0"/>
-                <a:cs typeface="Times New Roman" panose="02020603050405020304" pitchFamily="18" charset="0"/>
-              </a:rPr>
-              <a:t>divided</a:t>
-            </a:r>
-            <a:r>
-              <a:rPr lang="nl-NL" dirty="0" smtClean="0">
-                <a:solidFill>
-                  <a:schemeClr val="bg1"/>
-                </a:solidFill>
-                <a:ea typeface="Times New Roman" panose="02020603050405020304" pitchFamily="18" charset="0"/>
-                <a:cs typeface="Times New Roman" panose="02020603050405020304" pitchFamily="18" charset="0"/>
-              </a:rPr>
-              <a:t> </a:t>
-            </a:r>
-            <a:r>
-              <a:rPr lang="nl-NL" dirty="0" err="1" smtClean="0">
-                <a:solidFill>
-                  <a:schemeClr val="bg1"/>
-                </a:solidFill>
-                <a:ea typeface="Times New Roman" panose="02020603050405020304" pitchFamily="18" charset="0"/>
-                <a:cs typeface="Times New Roman" panose="02020603050405020304" pitchFamily="18" charset="0"/>
-              </a:rPr>
-              <a:t>into</a:t>
-            </a:r>
-            <a:r>
-              <a:rPr lang="nl-NL" dirty="0" smtClean="0">
-                <a:solidFill>
-                  <a:schemeClr val="bg1"/>
-                </a:solidFill>
-                <a:ea typeface="Times New Roman" panose="02020603050405020304" pitchFamily="18" charset="0"/>
-                <a:cs typeface="Times New Roman" panose="02020603050405020304" pitchFamily="18" charset="0"/>
-              </a:rPr>
-              <a:t> </a:t>
-            </a:r>
-            <a:r>
-              <a:rPr lang="nl-NL" dirty="0" err="1" smtClean="0">
-                <a:solidFill>
-                  <a:schemeClr val="bg1"/>
-                </a:solidFill>
-                <a:ea typeface="Times New Roman" panose="02020603050405020304" pitchFamily="18" charset="0"/>
-                <a:cs typeface="Times New Roman" panose="02020603050405020304" pitchFamily="18" charset="0"/>
-              </a:rPr>
-              <a:t>four</a:t>
-            </a:r>
-            <a:r>
-              <a:rPr lang="nl-NL" dirty="0" smtClean="0">
-                <a:solidFill>
-                  <a:schemeClr val="bg1"/>
-                </a:solidFill>
-                <a:ea typeface="Times New Roman" panose="02020603050405020304" pitchFamily="18" charset="0"/>
-                <a:cs typeface="Times New Roman" panose="02020603050405020304" pitchFamily="18" charset="0"/>
-              </a:rPr>
-              <a:t> </a:t>
-            </a:r>
-            <a:r>
-              <a:rPr lang="nl-NL" dirty="0" err="1" smtClean="0">
-                <a:solidFill>
-                  <a:schemeClr val="bg1"/>
-                </a:solidFill>
-                <a:ea typeface="Times New Roman" panose="02020603050405020304" pitchFamily="18" charset="0"/>
-                <a:cs typeface="Times New Roman" panose="02020603050405020304" pitchFamily="18" charset="0"/>
-              </a:rPr>
-              <a:t>blocks</a:t>
-            </a:r>
-            <a:r>
-              <a:rPr lang="nl-NL" dirty="0" smtClean="0">
-                <a:solidFill>
-                  <a:schemeClr val="bg1"/>
-                </a:solidFill>
-                <a:ea typeface="Times New Roman" panose="02020603050405020304" pitchFamily="18" charset="0"/>
-                <a:cs typeface="Times New Roman" panose="02020603050405020304" pitchFamily="18" charset="0"/>
-              </a:rPr>
-              <a:t>. </a:t>
-            </a:r>
-            <a:r>
-              <a:rPr lang="nl-NL" dirty="0" err="1" smtClean="0">
-                <a:solidFill>
-                  <a:schemeClr val="bg1"/>
-                </a:solidFill>
-                <a:ea typeface="Times New Roman" panose="02020603050405020304" pitchFamily="18" charset="0"/>
-                <a:cs typeface="Times New Roman" panose="02020603050405020304" pitchFamily="18" charset="0"/>
-              </a:rPr>
-              <a:t>You</a:t>
-            </a:r>
-            <a:r>
-              <a:rPr lang="nl-NL" dirty="0" smtClean="0">
-                <a:solidFill>
-                  <a:schemeClr val="bg1"/>
-                </a:solidFill>
-                <a:ea typeface="Times New Roman" panose="02020603050405020304" pitchFamily="18" charset="0"/>
-                <a:cs typeface="Times New Roman" panose="02020603050405020304" pitchFamily="18" charset="0"/>
-              </a:rPr>
-              <a:t> </a:t>
-            </a:r>
-            <a:r>
-              <a:rPr lang="nl-NL" dirty="0" err="1" smtClean="0">
-                <a:solidFill>
-                  <a:schemeClr val="bg1"/>
-                </a:solidFill>
-                <a:ea typeface="Times New Roman" panose="02020603050405020304" pitchFamily="18" charset="0"/>
-                <a:cs typeface="Times New Roman" panose="02020603050405020304" pitchFamily="18" charset="0"/>
-              </a:rPr>
-              <a:t>can</a:t>
-            </a:r>
-            <a:r>
-              <a:rPr lang="nl-NL" dirty="0" smtClean="0">
-                <a:solidFill>
-                  <a:schemeClr val="bg1"/>
-                </a:solidFill>
-                <a:ea typeface="Times New Roman" panose="02020603050405020304" pitchFamily="18" charset="0"/>
-                <a:cs typeface="Times New Roman" panose="02020603050405020304" pitchFamily="18" charset="0"/>
-              </a:rPr>
-              <a:t> rest </a:t>
-            </a:r>
-            <a:r>
-              <a:rPr lang="nl-NL" dirty="0" err="1" smtClean="0">
-                <a:solidFill>
-                  <a:schemeClr val="bg1"/>
-                </a:solidFill>
-                <a:ea typeface="Times New Roman" panose="02020603050405020304" pitchFamily="18" charset="0"/>
-                <a:cs typeface="Times New Roman" panose="02020603050405020304" pitchFamily="18" charset="0"/>
-              </a:rPr>
-              <a:t>for</a:t>
-            </a:r>
-            <a:r>
-              <a:rPr lang="nl-NL" dirty="0" smtClean="0">
-                <a:solidFill>
-                  <a:schemeClr val="bg1"/>
-                </a:solidFill>
-                <a:ea typeface="Times New Roman" panose="02020603050405020304" pitchFamily="18" charset="0"/>
-                <a:cs typeface="Times New Roman" panose="02020603050405020304" pitchFamily="18" charset="0"/>
-              </a:rPr>
-              <a:t> as long as </a:t>
-            </a:r>
-            <a:r>
-              <a:rPr lang="nl-NL" dirty="0" err="1" smtClean="0">
-                <a:solidFill>
-                  <a:schemeClr val="bg1"/>
-                </a:solidFill>
-                <a:ea typeface="Times New Roman" panose="02020603050405020304" pitchFamily="18" charset="0"/>
-                <a:cs typeface="Times New Roman" panose="02020603050405020304" pitchFamily="18" charset="0"/>
-              </a:rPr>
-              <a:t>you</a:t>
-            </a:r>
-            <a:r>
-              <a:rPr lang="nl-NL" dirty="0" smtClean="0">
-                <a:solidFill>
-                  <a:schemeClr val="bg1"/>
-                </a:solidFill>
-                <a:ea typeface="Times New Roman" panose="02020603050405020304" pitchFamily="18" charset="0"/>
-                <a:cs typeface="Times New Roman" panose="02020603050405020304" pitchFamily="18" charset="0"/>
-              </a:rPr>
-              <a:t> </a:t>
-            </a:r>
-            <a:r>
-              <a:rPr lang="nl-NL" dirty="0" err="1" smtClean="0">
-                <a:solidFill>
-                  <a:schemeClr val="bg1"/>
-                </a:solidFill>
-                <a:ea typeface="Times New Roman" panose="02020603050405020304" pitchFamily="18" charset="0"/>
-                <a:cs typeface="Times New Roman" panose="02020603050405020304" pitchFamily="18" charset="0"/>
-              </a:rPr>
-              <a:t>need</a:t>
-            </a:r>
-            <a:r>
-              <a:rPr lang="nl-NL" dirty="0" smtClean="0">
-                <a:solidFill>
-                  <a:schemeClr val="bg1"/>
-                </a:solidFill>
-                <a:ea typeface="Times New Roman" panose="02020603050405020304" pitchFamily="18" charset="0"/>
-                <a:cs typeface="Times New Roman" panose="02020603050405020304" pitchFamily="18" charset="0"/>
-              </a:rPr>
-              <a:t> in </a:t>
-            </a:r>
-            <a:r>
-              <a:rPr lang="nl-NL" dirty="0" err="1" smtClean="0">
-                <a:solidFill>
-                  <a:schemeClr val="bg1"/>
-                </a:solidFill>
-                <a:ea typeface="Times New Roman" panose="02020603050405020304" pitchFamily="18" charset="0"/>
-                <a:cs typeface="Times New Roman" panose="02020603050405020304" pitchFamily="18" charset="0"/>
-              </a:rPr>
-              <a:t>between</a:t>
-            </a:r>
-            <a:r>
-              <a:rPr lang="nl-NL" dirty="0" smtClean="0">
-                <a:solidFill>
-                  <a:schemeClr val="bg1"/>
-                </a:solidFill>
-                <a:ea typeface="Times New Roman" panose="02020603050405020304" pitchFamily="18" charset="0"/>
-                <a:cs typeface="Times New Roman" panose="02020603050405020304" pitchFamily="18" charset="0"/>
-              </a:rPr>
-              <a:t> </a:t>
-            </a:r>
-            <a:r>
-              <a:rPr lang="nl-NL" dirty="0" err="1" smtClean="0">
-                <a:solidFill>
-                  <a:schemeClr val="bg1"/>
-                </a:solidFill>
-                <a:ea typeface="Times New Roman" panose="02020603050405020304" pitchFamily="18" charset="0"/>
-                <a:cs typeface="Times New Roman" panose="02020603050405020304" pitchFamily="18" charset="0"/>
-              </a:rPr>
-              <a:t>blocks</a:t>
-            </a:r>
-            <a:r>
-              <a:rPr lang="nl-NL" dirty="0" smtClean="0">
-                <a:solidFill>
-                  <a:schemeClr val="bg1"/>
-                </a:solidFill>
-                <a:ea typeface="Times New Roman" panose="02020603050405020304" pitchFamily="18" charset="0"/>
-                <a:cs typeface="Times New Roman" panose="02020603050405020304" pitchFamily="18" charset="0"/>
-              </a:rPr>
-              <a:t>, but </a:t>
-            </a:r>
-            <a:r>
-              <a:rPr lang="nl-NL" dirty="0" err="1" smtClean="0">
-                <a:solidFill>
-                  <a:schemeClr val="bg1"/>
-                </a:solidFill>
-                <a:ea typeface="Times New Roman" panose="02020603050405020304" pitchFamily="18" charset="0"/>
-                <a:cs typeface="Times New Roman" panose="02020603050405020304" pitchFamily="18" charset="0"/>
-              </a:rPr>
-              <a:t>please</a:t>
-            </a:r>
-            <a:r>
-              <a:rPr lang="nl-NL" dirty="0" smtClean="0">
-                <a:solidFill>
-                  <a:schemeClr val="bg1"/>
-                </a:solidFill>
-                <a:ea typeface="Times New Roman" panose="02020603050405020304" pitchFamily="18" charset="0"/>
-                <a:cs typeface="Times New Roman" panose="02020603050405020304" pitchFamily="18" charset="0"/>
-              </a:rPr>
-              <a:t> </a:t>
-            </a:r>
-            <a:r>
-              <a:rPr lang="nl-NL" dirty="0" err="1" smtClean="0">
-                <a:solidFill>
-                  <a:schemeClr val="bg1"/>
-                </a:solidFill>
-                <a:ea typeface="Times New Roman" panose="02020603050405020304" pitchFamily="18" charset="0"/>
-                <a:cs typeface="Times New Roman" panose="02020603050405020304" pitchFamily="18" charset="0"/>
-              </a:rPr>
-              <a:t>try</a:t>
-            </a:r>
-            <a:r>
-              <a:rPr lang="nl-NL" dirty="0" smtClean="0">
-                <a:solidFill>
-                  <a:schemeClr val="bg1"/>
-                </a:solidFill>
-                <a:ea typeface="Times New Roman" panose="02020603050405020304" pitchFamily="18" charset="0"/>
-                <a:cs typeface="Times New Roman" panose="02020603050405020304" pitchFamily="18" charset="0"/>
-              </a:rPr>
-              <a:t> </a:t>
-            </a:r>
-            <a:r>
-              <a:rPr lang="nl-NL" dirty="0" err="1" smtClean="0">
-                <a:solidFill>
-                  <a:schemeClr val="bg1"/>
-                </a:solidFill>
-                <a:ea typeface="Times New Roman" panose="02020603050405020304" pitchFamily="18" charset="0"/>
-                <a:cs typeface="Times New Roman" panose="02020603050405020304" pitchFamily="18" charset="0"/>
-              </a:rPr>
-              <a:t>not</a:t>
-            </a:r>
-            <a:r>
-              <a:rPr lang="nl-NL" dirty="0" smtClean="0">
-                <a:solidFill>
-                  <a:schemeClr val="bg1"/>
-                </a:solidFill>
-                <a:ea typeface="Times New Roman" panose="02020603050405020304" pitchFamily="18" charset="0"/>
-                <a:cs typeface="Times New Roman" panose="02020603050405020304" pitchFamily="18" charset="0"/>
-              </a:rPr>
-              <a:t> </a:t>
-            </a:r>
-            <a:r>
-              <a:rPr lang="nl-NL" dirty="0" err="1" smtClean="0">
-                <a:solidFill>
-                  <a:schemeClr val="bg1"/>
-                </a:solidFill>
-                <a:ea typeface="Times New Roman" panose="02020603050405020304" pitchFamily="18" charset="0"/>
-                <a:cs typeface="Times New Roman" panose="02020603050405020304" pitchFamily="18" charset="0"/>
-              </a:rPr>
-              <a:t>to</a:t>
-            </a:r>
-            <a:r>
-              <a:rPr lang="nl-NL" dirty="0" smtClean="0">
-                <a:solidFill>
-                  <a:schemeClr val="bg1"/>
-                </a:solidFill>
-                <a:ea typeface="Times New Roman" panose="02020603050405020304" pitchFamily="18" charset="0"/>
-                <a:cs typeface="Times New Roman" panose="02020603050405020304" pitchFamily="18" charset="0"/>
-              </a:rPr>
-              <a:t> move </a:t>
-            </a:r>
-            <a:r>
-              <a:rPr lang="nl-NL" dirty="0" err="1" smtClean="0">
-                <a:solidFill>
-                  <a:schemeClr val="bg1"/>
-                </a:solidFill>
-                <a:ea typeface="Times New Roman" panose="02020603050405020304" pitchFamily="18" charset="0"/>
-                <a:cs typeface="Times New Roman" panose="02020603050405020304" pitchFamily="18" charset="0"/>
-              </a:rPr>
-              <a:t>too</a:t>
-            </a:r>
-            <a:r>
-              <a:rPr lang="nl-NL" dirty="0" smtClean="0">
-                <a:solidFill>
-                  <a:schemeClr val="bg1"/>
-                </a:solidFill>
-                <a:ea typeface="Times New Roman" panose="02020603050405020304" pitchFamily="18" charset="0"/>
-                <a:cs typeface="Times New Roman" panose="02020603050405020304" pitchFamily="18" charset="0"/>
-              </a:rPr>
-              <a:t> </a:t>
-            </a:r>
-            <a:r>
-              <a:rPr lang="nl-NL" dirty="0" err="1" smtClean="0">
-                <a:solidFill>
-                  <a:schemeClr val="bg1"/>
-                </a:solidFill>
-                <a:ea typeface="Times New Roman" panose="02020603050405020304" pitchFamily="18" charset="0"/>
-                <a:cs typeface="Times New Roman" panose="02020603050405020304" pitchFamily="18" charset="0"/>
-              </a:rPr>
-              <a:t>much</a:t>
-            </a:r>
-            <a:r>
-              <a:rPr lang="nl-NL" dirty="0" smtClean="0">
-                <a:solidFill>
-                  <a:schemeClr val="bg1"/>
-                </a:solidFill>
-                <a:ea typeface="Times New Roman" panose="02020603050405020304" pitchFamily="18" charset="0"/>
-                <a:cs typeface="Times New Roman" panose="02020603050405020304" pitchFamily="18" charset="0"/>
-              </a:rPr>
-              <a:t> </a:t>
-            </a:r>
-            <a:r>
-              <a:rPr lang="nl-NL" dirty="0" err="1" smtClean="0">
-                <a:solidFill>
-                  <a:schemeClr val="bg1"/>
-                </a:solidFill>
-                <a:ea typeface="Times New Roman" panose="02020603050405020304" pitchFamily="18" charset="0"/>
-                <a:cs typeface="Times New Roman" panose="02020603050405020304" pitchFamily="18" charset="0"/>
-              </a:rPr>
-              <a:t>and</a:t>
-            </a:r>
-            <a:r>
-              <a:rPr lang="nl-NL" dirty="0" smtClean="0">
-                <a:solidFill>
-                  <a:schemeClr val="bg1"/>
-                </a:solidFill>
-                <a:ea typeface="Times New Roman" panose="02020603050405020304" pitchFamily="18" charset="0"/>
-                <a:cs typeface="Times New Roman" panose="02020603050405020304" pitchFamily="18" charset="0"/>
-              </a:rPr>
-              <a:t> keep </a:t>
-            </a:r>
-            <a:r>
-              <a:rPr lang="nl-NL" dirty="0" err="1" smtClean="0">
-                <a:solidFill>
-                  <a:schemeClr val="bg1"/>
-                </a:solidFill>
-                <a:ea typeface="Times New Roman" panose="02020603050405020304" pitchFamily="18" charset="0"/>
-                <a:cs typeface="Times New Roman" panose="02020603050405020304" pitchFamily="18" charset="0"/>
-              </a:rPr>
-              <a:t>your</a:t>
-            </a:r>
-            <a:r>
-              <a:rPr lang="nl-NL" dirty="0" smtClean="0">
-                <a:solidFill>
-                  <a:schemeClr val="bg1"/>
-                </a:solidFill>
-                <a:ea typeface="Times New Roman" panose="02020603050405020304" pitchFamily="18" charset="0"/>
-                <a:cs typeface="Times New Roman" panose="02020603050405020304" pitchFamily="18" charset="0"/>
-              </a:rPr>
-              <a:t> </a:t>
-            </a:r>
-            <a:r>
-              <a:rPr lang="nl-NL" dirty="0" err="1" smtClean="0">
-                <a:solidFill>
-                  <a:schemeClr val="bg1"/>
-                </a:solidFill>
-                <a:ea typeface="Times New Roman" panose="02020603050405020304" pitchFamily="18" charset="0"/>
-                <a:cs typeface="Times New Roman" panose="02020603050405020304" pitchFamily="18" charset="0"/>
-              </a:rPr>
-              <a:t>head</a:t>
-            </a:r>
-            <a:r>
-              <a:rPr lang="nl-NL" dirty="0" smtClean="0">
-                <a:solidFill>
-                  <a:schemeClr val="bg1"/>
-                </a:solidFill>
-                <a:ea typeface="Times New Roman" panose="02020603050405020304" pitchFamily="18" charset="0"/>
-                <a:cs typeface="Times New Roman" panose="02020603050405020304" pitchFamily="18" charset="0"/>
-              </a:rPr>
-              <a:t> on </a:t>
-            </a:r>
-            <a:r>
-              <a:rPr lang="nl-NL" dirty="0" err="1" smtClean="0">
-                <a:solidFill>
-                  <a:schemeClr val="bg1"/>
-                </a:solidFill>
-                <a:ea typeface="Times New Roman" panose="02020603050405020304" pitchFamily="18" charset="0"/>
-                <a:cs typeface="Times New Roman" panose="02020603050405020304" pitchFamily="18" charset="0"/>
-              </a:rPr>
-              <a:t>the</a:t>
-            </a:r>
-            <a:r>
-              <a:rPr lang="nl-NL" dirty="0" smtClean="0">
-                <a:solidFill>
-                  <a:schemeClr val="bg1"/>
-                </a:solidFill>
-                <a:ea typeface="Times New Roman" panose="02020603050405020304" pitchFamily="18" charset="0"/>
-                <a:cs typeface="Times New Roman" panose="02020603050405020304" pitchFamily="18" charset="0"/>
-              </a:rPr>
-              <a:t> </a:t>
-            </a:r>
-            <a:r>
-              <a:rPr lang="nl-NL" dirty="0" err="1" smtClean="0">
-                <a:solidFill>
-                  <a:schemeClr val="bg1"/>
-                </a:solidFill>
-                <a:ea typeface="Times New Roman" panose="02020603050405020304" pitchFamily="18" charset="0"/>
-                <a:cs typeface="Times New Roman" panose="02020603050405020304" pitchFamily="18" charset="0"/>
-              </a:rPr>
-              <a:t>chinrest</a:t>
-            </a:r>
-            <a:r>
-              <a:rPr lang="nl-NL" dirty="0" smtClean="0">
-                <a:solidFill>
-                  <a:schemeClr val="bg1"/>
-                </a:solidFill>
-                <a:ea typeface="Times New Roman" panose="02020603050405020304" pitchFamily="18" charset="0"/>
-                <a:cs typeface="Times New Roman" panose="02020603050405020304" pitchFamily="18" charset="0"/>
-              </a:rPr>
-              <a:t>. </a:t>
-            </a:r>
-            <a:endParaRPr lang="nl-NL" dirty="0">
+              <a:rPr lang="en-US" sz="1600" dirty="0" smtClean="0">
+                <a:solidFill>
+                  <a:schemeClr val="bg1"/>
+                </a:solidFill>
+                <a:ea typeface="Times New Roman" panose="02020603050405020304" pitchFamily="18" charset="0"/>
+                <a:cs typeface="Times New Roman" panose="02020603050405020304" pitchFamily="18" charset="0"/>
+              </a:rPr>
+              <a:t>Between </a:t>
+            </a:r>
+            <a:r>
+              <a:rPr lang="en-US" sz="1600" dirty="0">
+                <a:solidFill>
+                  <a:schemeClr val="bg1"/>
+                </a:solidFill>
+                <a:ea typeface="Times New Roman" panose="02020603050405020304" pitchFamily="18" charset="0"/>
+                <a:cs typeface="Times New Roman" panose="02020603050405020304" pitchFamily="18" charset="0"/>
+              </a:rPr>
+              <a:t>trials, a fixation cross (+) will appear in the center of the screen. Please focus your gaze on this cross until the next trial </a:t>
+            </a:r>
+            <a:r>
+              <a:rPr lang="en-US" sz="1600" dirty="0" smtClean="0">
+                <a:solidFill>
+                  <a:schemeClr val="bg1"/>
+                </a:solidFill>
+                <a:ea typeface="Times New Roman" panose="02020603050405020304" pitchFamily="18" charset="0"/>
+                <a:cs typeface="Times New Roman" panose="02020603050405020304" pitchFamily="18" charset="0"/>
+              </a:rPr>
+              <a:t>begins.</a:t>
+            </a:r>
+            <a:endParaRPr lang="nl-NL" sz="1600" dirty="0">
               <a:solidFill>
                 <a:schemeClr val="bg1"/>
               </a:solidFill>
@@ -4548,7 +4064,496 @@
               <a:buFontTx/>
               <a:buChar char="-"/>
             </a:pPr>
-            <a:endParaRPr lang="en-US" dirty="0">
+            <a:r>
+              <a:rPr lang="nl-NL" sz="1600" dirty="0" smtClean="0">
+                <a:solidFill>
+                  <a:schemeClr val="bg1"/>
+                </a:solidFill>
+                <a:ea typeface="Times New Roman" panose="02020603050405020304" pitchFamily="18" charset="0"/>
+                <a:cs typeface="Times New Roman" panose="02020603050405020304" pitchFamily="18" charset="0"/>
+              </a:rPr>
+              <a:t>The </a:t>
+            </a:r>
+            <a:r>
+              <a:rPr lang="nl-NL" sz="1600" dirty="0" err="1" smtClean="0">
+                <a:solidFill>
+                  <a:schemeClr val="bg1"/>
+                </a:solidFill>
+                <a:ea typeface="Times New Roman" panose="02020603050405020304" pitchFamily="18" charset="0"/>
+                <a:cs typeface="Times New Roman" panose="02020603050405020304" pitchFamily="18" charset="0"/>
+              </a:rPr>
+              <a:t>session</a:t>
+            </a:r>
+            <a:r>
+              <a:rPr lang="nl-NL" sz="1600" dirty="0" smtClean="0">
+                <a:solidFill>
+                  <a:schemeClr val="bg1"/>
+                </a:solidFill>
+                <a:ea typeface="Times New Roman" panose="02020603050405020304" pitchFamily="18" charset="0"/>
+                <a:cs typeface="Times New Roman" panose="02020603050405020304" pitchFamily="18" charset="0"/>
+              </a:rPr>
+              <a:t> is </a:t>
+            </a:r>
+            <a:r>
+              <a:rPr lang="nl-NL" sz="1600" dirty="0" err="1" smtClean="0">
+                <a:solidFill>
+                  <a:schemeClr val="bg1"/>
+                </a:solidFill>
+                <a:ea typeface="Times New Roman" panose="02020603050405020304" pitchFamily="18" charset="0"/>
+                <a:cs typeface="Times New Roman" panose="02020603050405020304" pitchFamily="18" charset="0"/>
+              </a:rPr>
+              <a:t>divided</a:t>
+            </a:r>
+            <a:r>
+              <a:rPr lang="nl-NL" sz="1600" dirty="0" smtClean="0">
+                <a:solidFill>
+                  <a:schemeClr val="bg1"/>
+                </a:solidFill>
+                <a:ea typeface="Times New Roman" panose="02020603050405020304" pitchFamily="18" charset="0"/>
+                <a:cs typeface="Times New Roman" panose="02020603050405020304" pitchFamily="18" charset="0"/>
+              </a:rPr>
+              <a:t> </a:t>
+            </a:r>
+            <a:r>
+              <a:rPr lang="nl-NL" sz="1600" dirty="0" err="1" smtClean="0">
+                <a:solidFill>
+                  <a:schemeClr val="bg1"/>
+                </a:solidFill>
+                <a:ea typeface="Times New Roman" panose="02020603050405020304" pitchFamily="18" charset="0"/>
+                <a:cs typeface="Times New Roman" panose="02020603050405020304" pitchFamily="18" charset="0"/>
+              </a:rPr>
+              <a:t>into</a:t>
+            </a:r>
+            <a:r>
+              <a:rPr lang="nl-NL" sz="1600" dirty="0" smtClean="0">
+                <a:solidFill>
+                  <a:schemeClr val="bg1"/>
+                </a:solidFill>
+                <a:ea typeface="Times New Roman" panose="02020603050405020304" pitchFamily="18" charset="0"/>
+                <a:cs typeface="Times New Roman" panose="02020603050405020304" pitchFamily="18" charset="0"/>
+              </a:rPr>
+              <a:t> </a:t>
+            </a:r>
+            <a:r>
+              <a:rPr lang="nl-NL" sz="1600" dirty="0" err="1" smtClean="0">
+                <a:solidFill>
+                  <a:schemeClr val="bg1"/>
+                </a:solidFill>
+                <a:ea typeface="Times New Roman" panose="02020603050405020304" pitchFamily="18" charset="0"/>
+                <a:cs typeface="Times New Roman" panose="02020603050405020304" pitchFamily="18" charset="0"/>
+              </a:rPr>
+              <a:t>four</a:t>
+            </a:r>
+            <a:r>
+              <a:rPr lang="nl-NL" sz="1600" dirty="0" smtClean="0">
+                <a:solidFill>
+                  <a:schemeClr val="bg1"/>
+                </a:solidFill>
+                <a:ea typeface="Times New Roman" panose="02020603050405020304" pitchFamily="18" charset="0"/>
+                <a:cs typeface="Times New Roman" panose="02020603050405020304" pitchFamily="18" charset="0"/>
+              </a:rPr>
+              <a:t> </a:t>
+            </a:r>
+            <a:r>
+              <a:rPr lang="nl-NL" sz="1600" dirty="0" err="1" smtClean="0">
+                <a:solidFill>
+                  <a:schemeClr val="bg1"/>
+                </a:solidFill>
+                <a:ea typeface="Times New Roman" panose="02020603050405020304" pitchFamily="18" charset="0"/>
+                <a:cs typeface="Times New Roman" panose="02020603050405020304" pitchFamily="18" charset="0"/>
+              </a:rPr>
+              <a:t>blocks</a:t>
+            </a:r>
+            <a:r>
+              <a:rPr lang="nl-NL" sz="1600" dirty="0" smtClean="0">
+                <a:solidFill>
+                  <a:schemeClr val="bg1"/>
+                </a:solidFill>
+                <a:ea typeface="Times New Roman" panose="02020603050405020304" pitchFamily="18" charset="0"/>
+                <a:cs typeface="Times New Roman" panose="02020603050405020304" pitchFamily="18" charset="0"/>
+              </a:rPr>
+              <a:t>. </a:t>
+            </a:r>
+            <a:r>
+              <a:rPr lang="nl-NL" sz="1600" dirty="0" err="1" smtClean="0">
+                <a:solidFill>
+                  <a:schemeClr val="bg1"/>
+                </a:solidFill>
+                <a:ea typeface="Times New Roman" panose="02020603050405020304" pitchFamily="18" charset="0"/>
+                <a:cs typeface="Times New Roman" panose="02020603050405020304" pitchFamily="18" charset="0"/>
+              </a:rPr>
+              <a:t>You</a:t>
+            </a:r>
+            <a:r>
+              <a:rPr lang="nl-NL" sz="1600" dirty="0" smtClean="0">
+                <a:solidFill>
+                  <a:schemeClr val="bg1"/>
+                </a:solidFill>
+                <a:ea typeface="Times New Roman" panose="02020603050405020304" pitchFamily="18" charset="0"/>
+                <a:cs typeface="Times New Roman" panose="02020603050405020304" pitchFamily="18" charset="0"/>
+              </a:rPr>
+              <a:t> </a:t>
+            </a:r>
+            <a:r>
+              <a:rPr lang="nl-NL" sz="1600" dirty="0" err="1" smtClean="0">
+                <a:solidFill>
+                  <a:schemeClr val="bg1"/>
+                </a:solidFill>
+                <a:ea typeface="Times New Roman" panose="02020603050405020304" pitchFamily="18" charset="0"/>
+                <a:cs typeface="Times New Roman" panose="02020603050405020304" pitchFamily="18" charset="0"/>
+              </a:rPr>
+              <a:t>can</a:t>
+            </a:r>
+            <a:r>
+              <a:rPr lang="nl-NL" sz="1600" dirty="0" smtClean="0">
+                <a:solidFill>
+                  <a:schemeClr val="bg1"/>
+                </a:solidFill>
+                <a:ea typeface="Times New Roman" panose="02020603050405020304" pitchFamily="18" charset="0"/>
+                <a:cs typeface="Times New Roman" panose="02020603050405020304" pitchFamily="18" charset="0"/>
+              </a:rPr>
+              <a:t> rest </a:t>
+            </a:r>
+            <a:r>
+              <a:rPr lang="nl-NL" sz="1600" dirty="0" err="1" smtClean="0">
+                <a:solidFill>
+                  <a:schemeClr val="bg1"/>
+                </a:solidFill>
+                <a:ea typeface="Times New Roman" panose="02020603050405020304" pitchFamily="18" charset="0"/>
+                <a:cs typeface="Times New Roman" panose="02020603050405020304" pitchFamily="18" charset="0"/>
+              </a:rPr>
+              <a:t>for</a:t>
+            </a:r>
+            <a:r>
+              <a:rPr lang="nl-NL" sz="1600" dirty="0" smtClean="0">
+                <a:solidFill>
+                  <a:schemeClr val="bg1"/>
+                </a:solidFill>
+                <a:ea typeface="Times New Roman" panose="02020603050405020304" pitchFamily="18" charset="0"/>
+                <a:cs typeface="Times New Roman" panose="02020603050405020304" pitchFamily="18" charset="0"/>
+              </a:rPr>
+              <a:t> as long as </a:t>
+            </a:r>
+            <a:r>
+              <a:rPr lang="nl-NL" sz="1600" dirty="0" err="1" smtClean="0">
+                <a:solidFill>
+                  <a:schemeClr val="bg1"/>
+                </a:solidFill>
+                <a:ea typeface="Times New Roman" panose="02020603050405020304" pitchFamily="18" charset="0"/>
+                <a:cs typeface="Times New Roman" panose="02020603050405020304" pitchFamily="18" charset="0"/>
+              </a:rPr>
+              <a:t>you</a:t>
+            </a:r>
+            <a:r>
+              <a:rPr lang="nl-NL" sz="1600" dirty="0" smtClean="0">
+                <a:solidFill>
+                  <a:schemeClr val="bg1"/>
+                </a:solidFill>
+                <a:ea typeface="Times New Roman" panose="02020603050405020304" pitchFamily="18" charset="0"/>
+                <a:cs typeface="Times New Roman" panose="02020603050405020304" pitchFamily="18" charset="0"/>
+              </a:rPr>
+              <a:t> </a:t>
+            </a:r>
+            <a:r>
+              <a:rPr lang="nl-NL" sz="1600" dirty="0" err="1" smtClean="0">
+                <a:solidFill>
+                  <a:schemeClr val="bg1"/>
+                </a:solidFill>
+                <a:ea typeface="Times New Roman" panose="02020603050405020304" pitchFamily="18" charset="0"/>
+                <a:cs typeface="Times New Roman" panose="02020603050405020304" pitchFamily="18" charset="0"/>
+              </a:rPr>
+              <a:t>need</a:t>
+            </a:r>
+            <a:r>
+              <a:rPr lang="nl-NL" sz="1600" dirty="0" smtClean="0">
+                <a:solidFill>
+                  <a:schemeClr val="bg1"/>
+                </a:solidFill>
+                <a:ea typeface="Times New Roman" panose="02020603050405020304" pitchFamily="18" charset="0"/>
+                <a:cs typeface="Times New Roman" panose="02020603050405020304" pitchFamily="18" charset="0"/>
+              </a:rPr>
+              <a:t> in </a:t>
+            </a:r>
+            <a:r>
+              <a:rPr lang="nl-NL" sz="1600" dirty="0" err="1" smtClean="0">
+                <a:solidFill>
+                  <a:schemeClr val="bg1"/>
+                </a:solidFill>
+                <a:ea typeface="Times New Roman" panose="02020603050405020304" pitchFamily="18" charset="0"/>
+                <a:cs typeface="Times New Roman" panose="02020603050405020304" pitchFamily="18" charset="0"/>
+              </a:rPr>
+              <a:t>between</a:t>
+            </a:r>
+            <a:r>
+              <a:rPr lang="nl-NL" sz="1600" dirty="0" smtClean="0">
+                <a:solidFill>
+                  <a:schemeClr val="bg1"/>
+                </a:solidFill>
+                <a:ea typeface="Times New Roman" panose="02020603050405020304" pitchFamily="18" charset="0"/>
+                <a:cs typeface="Times New Roman" panose="02020603050405020304" pitchFamily="18" charset="0"/>
+              </a:rPr>
+              <a:t> </a:t>
+            </a:r>
+            <a:r>
+              <a:rPr lang="nl-NL" sz="1600" dirty="0" err="1" smtClean="0">
+                <a:solidFill>
+                  <a:schemeClr val="bg1"/>
+                </a:solidFill>
+                <a:ea typeface="Times New Roman" panose="02020603050405020304" pitchFamily="18" charset="0"/>
+                <a:cs typeface="Times New Roman" panose="02020603050405020304" pitchFamily="18" charset="0"/>
+              </a:rPr>
+              <a:t>blocks</a:t>
+            </a:r>
+            <a:r>
+              <a:rPr lang="nl-NL" sz="1600" dirty="0" smtClean="0">
+                <a:solidFill>
+                  <a:schemeClr val="bg1"/>
+                </a:solidFill>
+                <a:ea typeface="Times New Roman" panose="02020603050405020304" pitchFamily="18" charset="0"/>
+                <a:cs typeface="Times New Roman" panose="02020603050405020304" pitchFamily="18" charset="0"/>
+              </a:rPr>
+              <a:t>, but </a:t>
+            </a:r>
+            <a:r>
+              <a:rPr lang="nl-NL" sz="1600" dirty="0" err="1" smtClean="0">
+                <a:solidFill>
+                  <a:schemeClr val="bg1"/>
+                </a:solidFill>
+                <a:ea typeface="Times New Roman" panose="02020603050405020304" pitchFamily="18" charset="0"/>
+                <a:cs typeface="Times New Roman" panose="02020603050405020304" pitchFamily="18" charset="0"/>
+              </a:rPr>
+              <a:t>please</a:t>
+            </a:r>
+            <a:r>
+              <a:rPr lang="nl-NL" sz="1600" dirty="0" smtClean="0">
+                <a:solidFill>
+                  <a:schemeClr val="bg1"/>
+                </a:solidFill>
+                <a:ea typeface="Times New Roman" panose="02020603050405020304" pitchFamily="18" charset="0"/>
+                <a:cs typeface="Times New Roman" panose="02020603050405020304" pitchFamily="18" charset="0"/>
+              </a:rPr>
+              <a:t> </a:t>
+            </a:r>
+            <a:r>
+              <a:rPr lang="nl-NL" sz="1600" dirty="0" err="1" smtClean="0">
+                <a:solidFill>
+                  <a:schemeClr val="bg1"/>
+                </a:solidFill>
+                <a:ea typeface="Times New Roman" panose="02020603050405020304" pitchFamily="18" charset="0"/>
+                <a:cs typeface="Times New Roman" panose="02020603050405020304" pitchFamily="18" charset="0"/>
+              </a:rPr>
+              <a:t>try</a:t>
+            </a:r>
+            <a:r>
+              <a:rPr lang="nl-NL" sz="1600" dirty="0" smtClean="0">
+                <a:solidFill>
+                  <a:schemeClr val="bg1"/>
+                </a:solidFill>
+                <a:ea typeface="Times New Roman" panose="02020603050405020304" pitchFamily="18" charset="0"/>
+                <a:cs typeface="Times New Roman" panose="02020603050405020304" pitchFamily="18" charset="0"/>
+              </a:rPr>
+              <a:t> </a:t>
+            </a:r>
+            <a:r>
+              <a:rPr lang="nl-NL" sz="1600" dirty="0" err="1" smtClean="0">
+                <a:solidFill>
+                  <a:schemeClr val="bg1"/>
+                </a:solidFill>
+                <a:ea typeface="Times New Roman" panose="02020603050405020304" pitchFamily="18" charset="0"/>
+                <a:cs typeface="Times New Roman" panose="02020603050405020304" pitchFamily="18" charset="0"/>
+              </a:rPr>
+              <a:t>not</a:t>
+            </a:r>
+            <a:r>
+              <a:rPr lang="nl-NL" sz="1600" dirty="0" smtClean="0">
+                <a:solidFill>
+                  <a:schemeClr val="bg1"/>
+                </a:solidFill>
+                <a:ea typeface="Times New Roman" panose="02020603050405020304" pitchFamily="18" charset="0"/>
+                <a:cs typeface="Times New Roman" panose="02020603050405020304" pitchFamily="18" charset="0"/>
+              </a:rPr>
+              <a:t> </a:t>
+            </a:r>
+            <a:r>
+              <a:rPr lang="nl-NL" sz="1600" dirty="0" err="1" smtClean="0">
+                <a:solidFill>
+                  <a:schemeClr val="bg1"/>
+                </a:solidFill>
+                <a:ea typeface="Times New Roman" panose="02020603050405020304" pitchFamily="18" charset="0"/>
+                <a:cs typeface="Times New Roman" panose="02020603050405020304" pitchFamily="18" charset="0"/>
+              </a:rPr>
+              <a:t>to</a:t>
+            </a:r>
+            <a:r>
+              <a:rPr lang="nl-NL" sz="1600" dirty="0" smtClean="0">
+                <a:solidFill>
+                  <a:schemeClr val="bg1"/>
+                </a:solidFill>
+                <a:ea typeface="Times New Roman" panose="02020603050405020304" pitchFamily="18" charset="0"/>
+                <a:cs typeface="Times New Roman" panose="02020603050405020304" pitchFamily="18" charset="0"/>
+              </a:rPr>
+              <a:t> move </a:t>
+            </a:r>
+            <a:r>
+              <a:rPr lang="nl-NL" sz="1600" dirty="0" err="1" smtClean="0">
+                <a:solidFill>
+                  <a:schemeClr val="bg1"/>
+                </a:solidFill>
+                <a:ea typeface="Times New Roman" panose="02020603050405020304" pitchFamily="18" charset="0"/>
+                <a:cs typeface="Times New Roman" panose="02020603050405020304" pitchFamily="18" charset="0"/>
+              </a:rPr>
+              <a:t>too</a:t>
+            </a:r>
+            <a:r>
+              <a:rPr lang="nl-NL" sz="1600" dirty="0" smtClean="0">
+                <a:solidFill>
+                  <a:schemeClr val="bg1"/>
+                </a:solidFill>
+                <a:ea typeface="Times New Roman" panose="02020603050405020304" pitchFamily="18" charset="0"/>
+                <a:cs typeface="Times New Roman" panose="02020603050405020304" pitchFamily="18" charset="0"/>
+              </a:rPr>
+              <a:t> </a:t>
+            </a:r>
+            <a:r>
+              <a:rPr lang="nl-NL" sz="1600" dirty="0" err="1" smtClean="0">
+                <a:solidFill>
+                  <a:schemeClr val="bg1"/>
+                </a:solidFill>
+                <a:ea typeface="Times New Roman" panose="02020603050405020304" pitchFamily="18" charset="0"/>
+                <a:cs typeface="Times New Roman" panose="02020603050405020304" pitchFamily="18" charset="0"/>
+              </a:rPr>
+              <a:t>much</a:t>
+            </a:r>
+            <a:r>
+              <a:rPr lang="nl-NL" sz="1600" dirty="0" smtClean="0">
+                <a:solidFill>
+                  <a:schemeClr val="bg1"/>
+                </a:solidFill>
+                <a:ea typeface="Times New Roman" panose="02020603050405020304" pitchFamily="18" charset="0"/>
+                <a:cs typeface="Times New Roman" panose="02020603050405020304" pitchFamily="18" charset="0"/>
+              </a:rPr>
+              <a:t> </a:t>
+            </a:r>
+            <a:r>
+              <a:rPr lang="nl-NL" sz="1600" dirty="0" err="1" smtClean="0">
+                <a:solidFill>
+                  <a:schemeClr val="bg1"/>
+                </a:solidFill>
+                <a:ea typeface="Times New Roman" panose="02020603050405020304" pitchFamily="18" charset="0"/>
+                <a:cs typeface="Times New Roman" panose="02020603050405020304" pitchFamily="18" charset="0"/>
+              </a:rPr>
+              <a:t>and</a:t>
+            </a:r>
+            <a:r>
+              <a:rPr lang="nl-NL" sz="1600" dirty="0" smtClean="0">
+                <a:solidFill>
+                  <a:schemeClr val="bg1"/>
+                </a:solidFill>
+                <a:ea typeface="Times New Roman" panose="02020603050405020304" pitchFamily="18" charset="0"/>
+                <a:cs typeface="Times New Roman" panose="02020603050405020304" pitchFamily="18" charset="0"/>
+              </a:rPr>
+              <a:t> keep </a:t>
+            </a:r>
+            <a:r>
+              <a:rPr lang="nl-NL" sz="1600" dirty="0" err="1" smtClean="0">
+                <a:solidFill>
+                  <a:schemeClr val="bg1"/>
+                </a:solidFill>
+                <a:ea typeface="Times New Roman" panose="02020603050405020304" pitchFamily="18" charset="0"/>
+                <a:cs typeface="Times New Roman" panose="02020603050405020304" pitchFamily="18" charset="0"/>
+              </a:rPr>
+              <a:t>your</a:t>
+            </a:r>
+            <a:r>
+              <a:rPr lang="nl-NL" sz="1600" dirty="0" smtClean="0">
+                <a:solidFill>
+                  <a:schemeClr val="bg1"/>
+                </a:solidFill>
+                <a:ea typeface="Times New Roman" panose="02020603050405020304" pitchFamily="18" charset="0"/>
+                <a:cs typeface="Times New Roman" panose="02020603050405020304" pitchFamily="18" charset="0"/>
+              </a:rPr>
+              <a:t> </a:t>
+            </a:r>
+            <a:r>
+              <a:rPr lang="nl-NL" sz="1600" dirty="0" err="1" smtClean="0">
+                <a:solidFill>
+                  <a:schemeClr val="bg1"/>
+                </a:solidFill>
+                <a:ea typeface="Times New Roman" panose="02020603050405020304" pitchFamily="18" charset="0"/>
+                <a:cs typeface="Times New Roman" panose="02020603050405020304" pitchFamily="18" charset="0"/>
+              </a:rPr>
+              <a:t>head</a:t>
+            </a:r>
+            <a:r>
+              <a:rPr lang="nl-NL" sz="1600" dirty="0" smtClean="0">
+                <a:solidFill>
+                  <a:schemeClr val="bg1"/>
+                </a:solidFill>
+                <a:ea typeface="Times New Roman" panose="02020603050405020304" pitchFamily="18" charset="0"/>
+                <a:cs typeface="Times New Roman" panose="02020603050405020304" pitchFamily="18" charset="0"/>
+              </a:rPr>
+              <a:t> on </a:t>
+            </a:r>
+            <a:r>
+              <a:rPr lang="nl-NL" sz="1600" dirty="0" err="1" smtClean="0">
+                <a:solidFill>
+                  <a:schemeClr val="bg1"/>
+                </a:solidFill>
+                <a:ea typeface="Times New Roman" panose="02020603050405020304" pitchFamily="18" charset="0"/>
+                <a:cs typeface="Times New Roman" panose="02020603050405020304" pitchFamily="18" charset="0"/>
+              </a:rPr>
+              <a:t>the</a:t>
+            </a:r>
+            <a:r>
+              <a:rPr lang="nl-NL" sz="1600" dirty="0" smtClean="0">
+                <a:solidFill>
+                  <a:schemeClr val="bg1"/>
+                </a:solidFill>
+                <a:ea typeface="Times New Roman" panose="02020603050405020304" pitchFamily="18" charset="0"/>
+                <a:cs typeface="Times New Roman" panose="02020603050405020304" pitchFamily="18" charset="0"/>
+              </a:rPr>
+              <a:t> </a:t>
+            </a:r>
+            <a:r>
+              <a:rPr lang="nl-NL" sz="1600" dirty="0" err="1" smtClean="0">
+                <a:solidFill>
+                  <a:schemeClr val="bg1"/>
+                </a:solidFill>
+                <a:ea typeface="Times New Roman" panose="02020603050405020304" pitchFamily="18" charset="0"/>
+                <a:cs typeface="Times New Roman" panose="02020603050405020304" pitchFamily="18" charset="0"/>
+              </a:rPr>
+              <a:t>chinrest</a:t>
+            </a:r>
+            <a:r>
+              <a:rPr lang="nl-NL" sz="1600" dirty="0" smtClean="0">
+                <a:solidFill>
+                  <a:schemeClr val="bg1"/>
+                </a:solidFill>
+                <a:ea typeface="Times New Roman" panose="02020603050405020304" pitchFamily="18" charset="0"/>
+                <a:cs typeface="Times New Roman" panose="02020603050405020304" pitchFamily="18" charset="0"/>
+              </a:rPr>
+              <a:t>. </a:t>
+            </a:r>
+            <a:endParaRPr lang="nl-NL" sz="1600" dirty="0">
+              <a:solidFill>
+                <a:schemeClr val="bg1"/>
+              </a:solidFill>
+              <a:ea typeface="Times New Roman" panose="02020603050405020304" pitchFamily="18" charset="0"/>
+              <a:cs typeface="Times New Roman" panose="02020603050405020304" pitchFamily="18" charset="0"/>
+            </a:endParaRPr>
+          </a:p>
+          <a:p>
+            <a:pPr marL="742950" lvl="1" indent="-285750">
+              <a:lnSpc>
+                <a:spcPct val="107000"/>
+              </a:lnSpc>
+              <a:spcAft>
+                <a:spcPts val="800"/>
+              </a:spcAft>
+              <a:buFontTx/>
+              <a:buChar char="-"/>
+            </a:pPr>
+            <a:endParaRPr lang="en-US" sz="1600" dirty="0">
               <a:solidFill>
                 <a:schemeClr val="bg1"/>
               </a:solidFill>
@@ -4566,7 +4571,7 @@
               </a:spcAft>
             </a:pPr>
             <a:r>
-              <a:rPr lang="en-US" dirty="0" smtClean="0">
+              <a:rPr lang="en-US" sz="1600" dirty="0" smtClean="0">
                 <a:solidFill>
                   <a:schemeClr val="bg1"/>
                 </a:solidFill>
@@ -4576,7 +4581,7 @@
               <a:t>Use </a:t>
             </a:r>
             <a:r>
-              <a:rPr lang="en-US" dirty="0">
+              <a:rPr lang="en-US" sz="1600" dirty="0">
                 <a:solidFill>
                   <a:schemeClr val="bg1"/>
                 </a:solidFill>
@@ -4586,7 +4591,7 @@
               <a:t>the A, X, M, L keys to select your answer (from left to right</a:t>
             </a:r>
             <a:r>
-              <a:rPr lang="en-US" dirty="0" smtClean="0">
+              <a:rPr lang="en-US" sz="1600" dirty="0" smtClean="0">
                 <a:solidFill>
                   <a:schemeClr val="bg1"/>
                 </a:solidFill>
@@ -4595,7 +4600,7 @@
               </a:rPr>
               <a:t>).</a:t>
             </a:r>
-            <a:endParaRPr lang="nl-NL" dirty="0" smtClean="0">
+            <a:endParaRPr lang="nl-NL" sz="1600" dirty="0" smtClean="0">
               <a:solidFill>
                 <a:schemeClr val="bg1"/>
               </a:solidFill>
@@ -4613,7 +4618,7 @@
               </a:spcAft>
             </a:pPr>
             <a:r>
-              <a:rPr lang="en-US" dirty="0" smtClean="0">
+              <a:rPr lang="en-US" sz="1600" dirty="0" smtClean="0">
                 <a:solidFill>
                   <a:schemeClr val="bg1"/>
                 </a:solidFill>
@@ -4623,7 +4628,7 @@
               <a:t>Place </a:t>
             </a:r>
             <a:r>
-              <a:rPr lang="en-US" dirty="0">
+              <a:rPr lang="en-US" sz="1600" dirty="0">
                 <a:solidFill>
                   <a:schemeClr val="bg1"/>
                 </a:solidFill>
@@ -4633,7 +4638,7 @@
               <a:t>your fingers on the </a:t>
             </a:r>
             <a:r>
-              <a:rPr lang="en-US" dirty="0" smtClean="0">
+              <a:rPr lang="en-US" sz="1600" dirty="0" smtClean="0">
                 <a:solidFill>
                   <a:schemeClr val="bg1"/>
                 </a:solidFill>
@@ -4643,7 +4648,7 @@
               <a:t>keys now and press </a:t>
             </a:r>
             <a:r>
-              <a:rPr lang="en-US" dirty="0">
+              <a:rPr lang="en-US" sz="1600" dirty="0">
                 <a:solidFill>
                   <a:schemeClr val="bg1"/>
                 </a:solidFill>
@@ -4653,7 +4658,7 @@
               <a:t>any of </a:t>
             </a:r>
             <a:r>
-              <a:rPr lang="en-US" dirty="0" smtClean="0">
+              <a:rPr lang="en-US" sz="1600" dirty="0" smtClean="0">
                 <a:solidFill>
                   <a:schemeClr val="bg1"/>
                 </a:solidFill>

</xml_diff>